<commit_message>
Update BHQ Project- Evyatar Yuval.pptx
</commit_message>
<xml_diff>
--- a/BHQ Project- Evyatar Yuval.pptx
+++ b/BHQ Project- Evyatar Yuval.pptx
@@ -24697,7 +24697,7 @@
         </p:blipFill>
         <p:spPr>
           <a:xfrm flipH="1">
-            <a:off x="-5" y="974"/>
+            <a:off x="-5" y="10806"/>
             <a:ext cx="12192001" cy="2369364"/>
           </a:xfrm>
           <a:prstGeom prst="rect">
@@ -24783,10 +24783,10 @@
       </p:sp>
       <p:pic>
         <p:nvPicPr>
-          <p:cNvPr id="4" name="תמונה 3">
+          <p:cNvPr id="5" name="Picture 4">
             <a:extLst>
               <a:ext uri="{FF2B5EF4-FFF2-40B4-BE49-F238E27FC236}">
-                <a16:creationId xmlns:a16="http://schemas.microsoft.com/office/drawing/2014/main" id="{5775E849-0FDA-4080-95BD-BD81954E27CE}"/>
+                <a16:creationId xmlns:a16="http://schemas.microsoft.com/office/drawing/2014/main" id="{4D0A84BE-03BA-48FE-8234-CABC964AA4B7}"/>
               </a:ext>
             </a:extLst>
           </p:cNvPr>
@@ -24803,8 +24803,8 @@
         </p:blipFill>
         <p:spPr>
           <a:xfrm>
-            <a:off x="1286013" y="2821808"/>
-            <a:ext cx="4154513" cy="3444529"/>
+            <a:off x="6438686" y="2677149"/>
+            <a:ext cx="4189939" cy="3601366"/>
           </a:xfrm>
           <a:prstGeom prst="rect">
             <a:avLst/>
@@ -24813,10 +24813,10 @@
       </p:pic>
       <p:pic>
         <p:nvPicPr>
-          <p:cNvPr id="12" name="תמונה 11">
+          <p:cNvPr id="7" name="Picture 6">
             <a:extLst>
               <a:ext uri="{FF2B5EF4-FFF2-40B4-BE49-F238E27FC236}">
-                <a16:creationId xmlns:a16="http://schemas.microsoft.com/office/drawing/2014/main" id="{6EEA9032-5032-408A-B267-94988D49121F}"/>
+                <a16:creationId xmlns:a16="http://schemas.microsoft.com/office/drawing/2014/main" id="{25B3CDFD-C3CD-458E-AEE6-E9D48920DB7D}"/>
               </a:ext>
             </a:extLst>
           </p:cNvPr>
@@ -24833,8 +24833,8 @@
         </p:blipFill>
         <p:spPr>
           <a:xfrm>
-            <a:off x="6751476" y="2758577"/>
-            <a:ext cx="4227893" cy="3458171"/>
+            <a:off x="1382065" y="2677148"/>
+            <a:ext cx="4138109" cy="3601366"/>
           </a:xfrm>
           <a:prstGeom prst="rect">
             <a:avLst/>
@@ -26308,12 +26308,11 @@
 </file>
 
 <file path=customXml/item1.xml><?xml version="1.0" encoding="utf-8"?>
-<?mso-contentType ?>
-<FormTemplates xmlns="http://schemas.microsoft.com/sharepoint/v3/contenttype/forms">
-  <Display>DocumentLibraryForm</Display>
-  <Edit>DocumentLibraryForm</Edit>
-  <New>DocumentLibraryForm</New>
-</FormTemplates>
+<p:properties xmlns:p="http://schemas.microsoft.com/office/2006/metadata/properties" xmlns:xsi="http://www.w3.org/2001/XMLSchema-instance" xmlns:pc="http://schemas.microsoft.com/office/infopath/2007/PartnerControls">
+  <documentManagement>
+    <MediaServiceKeyPoints xmlns="71af3243-3dd4-4a8d-8c0d-dd76da1f02a5" xsi:nil="true"/>
+  </documentManagement>
+</p:properties>
 </file>
 
 <file path=customXml/item2.xml><?xml version="1.0" encoding="utf-8"?>
@@ -26528,17 +26527,20 @@
 </file>
 
 <file path=customXml/item3.xml><?xml version="1.0" encoding="utf-8"?>
-<p:properties xmlns:p="http://schemas.microsoft.com/office/2006/metadata/properties" xmlns:xsi="http://www.w3.org/2001/XMLSchema-instance" xmlns:pc="http://schemas.microsoft.com/office/infopath/2007/PartnerControls">
-  <documentManagement>
-    <MediaServiceKeyPoints xmlns="71af3243-3dd4-4a8d-8c0d-dd76da1f02a5" xsi:nil="true"/>
-  </documentManagement>
-</p:properties>
+<?mso-contentType ?>
+<FormTemplates xmlns="http://schemas.microsoft.com/sharepoint/v3/contenttype/forms">
+  <Display>DocumentLibraryForm</Display>
+  <Edit>DocumentLibraryForm</Edit>
+  <New>DocumentLibraryForm</New>
+</FormTemplates>
 </file>
 
 <file path=customXml/itemProps1.xml><?xml version="1.0" encoding="utf-8"?>
-<ds:datastoreItem xmlns:ds="http://schemas.openxmlformats.org/officeDocument/2006/customXml" ds:itemID="{4F44C90D-2A62-4985-9618-3460247437B1}">
+<ds:datastoreItem xmlns:ds="http://schemas.openxmlformats.org/officeDocument/2006/customXml" ds:itemID="{788A2F88-55C5-4ED1-9541-807C65424763}">
   <ds:schemaRefs>
-    <ds:schemaRef ds:uri="http://schemas.microsoft.com/sharepoint/v3/contenttype/forms"/>
+    <ds:schemaRef ds:uri="http://schemas.microsoft.com/office/2006/metadata/properties"/>
+    <ds:schemaRef ds:uri="http://schemas.microsoft.com/office/infopath/2007/PartnerControls"/>
+    <ds:schemaRef ds:uri="71af3243-3dd4-4a8d-8c0d-dd76da1f02a5"/>
   </ds:schemaRefs>
 </ds:datastoreItem>
 </file>
@@ -26563,11 +26565,9 @@
 </file>
 
 <file path=customXml/itemProps3.xml><?xml version="1.0" encoding="utf-8"?>
-<ds:datastoreItem xmlns:ds="http://schemas.openxmlformats.org/officeDocument/2006/customXml" ds:itemID="{788A2F88-55C5-4ED1-9541-807C65424763}">
+<ds:datastoreItem xmlns:ds="http://schemas.openxmlformats.org/officeDocument/2006/customXml" ds:itemID="{4F44C90D-2A62-4985-9618-3460247437B1}">
   <ds:schemaRefs>
-    <ds:schemaRef ds:uri="http://schemas.microsoft.com/office/2006/metadata/properties"/>
-    <ds:schemaRef ds:uri="http://schemas.microsoft.com/office/infopath/2007/PartnerControls"/>
-    <ds:schemaRef ds:uri="71af3243-3dd4-4a8d-8c0d-dd76da1f02a5"/>
+    <ds:schemaRef ds:uri="http://schemas.microsoft.com/sharepoint/v3/contenttype/forms"/>
   </ds:schemaRefs>
 </ds:datastoreItem>
 </file>
</xml_diff>